<commit_message>
last minute presentation change, and deleted the old file
</commit_message>
<xml_diff>
--- a/docs/Car Rental Presentation.pptx
+++ b/docs/Car Rental Presentation.pptx
@@ -26,16 +26,22 @@
     <p:sldId id="271" r:id="rId21"/>
     <p:sldId id="272" r:id="rId22"/>
     <p:sldId id="273" r:id="rId23"/>
+    <p:sldId id="274" r:id="rId24"/>
+    <p:sldId id="275" r:id="rId25"/>
+    <p:sldId id="276" r:id="rId26"/>
+    <p:sldId id="277" r:id="rId27"/>
+    <p:sldId id="278" r:id="rId28"/>
+    <p:sldId id="279" r:id="rId29"/>
   </p:sldIdLst>
   <p:sldSz cy="5143500" cx="9144000"/>
   <p:notesSz cx="6858000" cy="9144000"/>
   <p:embeddedFontLst>
     <p:embeddedFont>
       <p:font typeface="Nunito"/>
-      <p:regular r:id="rId24"/>
-      <p:bold r:id="rId25"/>
-      <p:italic r:id="rId26"/>
-      <p:boldItalic r:id="rId27"/>
+      <p:regular r:id="rId30"/>
+      <p:bold r:id="rId31"/>
+      <p:italic r:id="rId32"/>
+      <p:boldItalic r:id="rId33"/>
     </p:embeddedFont>
   </p:embeddedFontLst>
   <p:defaultTextStyle>
@@ -1523,7 +1529,7 @@
       </p:grpSpPr>
       <p:sp>
         <p:nvSpPr>
-          <p:cNvPr id="217" name="Google Shape;217;g22bc7bbcbef_0_124:notes"/>
+          <p:cNvPr id="217" name="Google Shape;217;g22e906c1a5e_0_0:notes"/>
           <p:cNvSpPr/>
           <p:nvPr>
             <p:ph idx="2" type="sldImg"/>
@@ -1558,7 +1564,7 @@
       </p:sp>
       <p:sp>
         <p:nvSpPr>
-          <p:cNvPr id="218" name="Google Shape;218;g22bc7bbcbef_0_124:notes"/>
+          <p:cNvPr id="218" name="Google Shape;218;g22e906c1a5e_0_0:notes"/>
           <p:cNvSpPr txBox="1"/>
           <p:nvPr>
             <p:ph idx="1" type="body"/>
@@ -1608,7 +1614,7 @@
   <p:cSld>
     <p:spTree>
       <p:nvGrpSpPr>
-        <p:cNvPr id="222" name="Shape 222"/>
+        <p:cNvPr id="221" name="Shape 221"/>
         <p:cNvGrpSpPr/>
         <p:nvPr/>
       </p:nvGrpSpPr>
@@ -1622,7 +1628,7 @@
       </p:grpSpPr>
       <p:sp>
         <p:nvSpPr>
-          <p:cNvPr id="223" name="Google Shape;223;g22bc7bbcbef_0_129:notes"/>
+          <p:cNvPr id="222" name="Google Shape;222;g22e906c1a5e_0_6:notes"/>
           <p:cNvSpPr/>
           <p:nvPr>
             <p:ph idx="2" type="sldImg"/>
@@ -1657,7 +1663,106 @@
       </p:sp>
       <p:sp>
         <p:nvSpPr>
-          <p:cNvPr id="224" name="Google Shape;224;g22bc7bbcbef_0_129:notes"/>
+          <p:cNvPr id="223" name="Google Shape;223;g22e906c1a5e_0_6:notes"/>
+          <p:cNvSpPr txBox="1"/>
+          <p:nvPr>
+            <p:ph idx="1" type="body"/>
+          </p:nvPr>
+        </p:nvSpPr>
+        <p:spPr>
+          <a:xfrm>
+            <a:off x="685800" y="4343400"/>
+            <a:ext cx="5486400" cy="4114800"/>
+          </a:xfrm>
+          <a:prstGeom prst="rect">
+            <a:avLst/>
+          </a:prstGeom>
+        </p:spPr>
+        <p:txBody>
+          <a:bodyPr anchorCtr="0" anchor="t" bIns="91425" lIns="91425" spcFirstLastPara="1" rIns="91425" wrap="square" tIns="91425">
+            <a:noAutofit/>
+          </a:bodyPr>
+          <a:lstStyle/>
+          <a:p>
+            <a:pPr indent="0" lvl="0" marL="0" rtl="0" algn="l">
+              <a:spcBef>
+                <a:spcPts val="0"/>
+              </a:spcBef>
+              <a:spcAft>
+                <a:spcPts val="0"/>
+              </a:spcAft>
+              <a:buNone/>
+            </a:pPr>
+            <a:r>
+              <a:t/>
+            </a:r>
+            <a:endParaRPr/>
+          </a:p>
+        </p:txBody>
+      </p:sp>
+    </p:spTree>
+  </p:cSld>
+  <p:clrMapOvr>
+    <a:masterClrMapping/>
+  </p:clrMapOvr>
+</p:notes>
+</file>
+
+<file path=ppt/notesSlides/notesSlide19.xml><?xml version="1.0" encoding="utf-8"?>
+<p:notes xmlns:a="http://schemas.openxmlformats.org/drawingml/2006/main" xmlns:r="http://schemas.openxmlformats.org/officeDocument/2006/relationships" xmlns:mc="http://schemas.openxmlformats.org/markup-compatibility/2006" xmlns:mv="urn:schemas-microsoft-com:mac:vml" xmlns:p="http://schemas.openxmlformats.org/presentationml/2006/main" xmlns:c="http://schemas.openxmlformats.org/drawingml/2006/chart" xmlns:dgm="http://schemas.openxmlformats.org/drawingml/2006/diagram" xmlns:o="urn:schemas-microsoft-com:office:office" xmlns:v="urn:schemas-microsoft-com:vml" xmlns:pvml="urn:schemas-microsoft-com:office:powerpoint" xmlns:com="http://schemas.openxmlformats.org/drawingml/2006/compatibility" xmlns:p14="http://schemas.microsoft.com/office/powerpoint/2010/main" xmlns:p15="http://schemas.microsoft.com/office/powerpoint/2012/main" xmlns:ahyp="http://schemas.microsoft.com/office/drawing/2018/hyperlinkcolor" showMasterPhAnim="0" showMasterSp="0">
+  <p:cSld>
+    <p:spTree>
+      <p:nvGrpSpPr>
+        <p:cNvPr id="226" name="Shape 226"/>
+        <p:cNvGrpSpPr/>
+        <p:nvPr/>
+      </p:nvGrpSpPr>
+      <p:grpSpPr>
+        <a:xfrm>
+          <a:off x="0" y="0"/>
+          <a:ext cx="0" cy="0"/>
+          <a:chOff x="0" y="0"/>
+          <a:chExt cx="0" cy="0"/>
+        </a:xfrm>
+      </p:grpSpPr>
+      <p:sp>
+        <p:nvSpPr>
+          <p:cNvPr id="227" name="Google Shape;227;g22e906c1a5e_0_10:notes"/>
+          <p:cNvSpPr/>
+          <p:nvPr>
+            <p:ph idx="2" type="sldImg"/>
+          </p:nvPr>
+        </p:nvSpPr>
+        <p:spPr>
+          <a:xfrm>
+            <a:off x="381300" y="685800"/>
+            <a:ext cx="6096000" cy="3429000"/>
+          </a:xfrm>
+          <a:custGeom>
+            <a:rect b="b" l="l" r="r" t="t"/>
+            <a:pathLst>
+              <a:path extrusionOk="0" h="120000" w="120000">
+                <a:moveTo>
+                  <a:pt x="0" y="0"/>
+                </a:moveTo>
+                <a:lnTo>
+                  <a:pt x="120000" y="0"/>
+                </a:lnTo>
+                <a:lnTo>
+                  <a:pt x="120000" y="120000"/>
+                </a:lnTo>
+                <a:lnTo>
+                  <a:pt x="0" y="120000"/>
+                </a:lnTo>
+                <a:close/>
+              </a:path>
+            </a:pathLst>
+          </a:custGeom>
+        </p:spPr>
+      </p:sp>
+      <p:sp>
+        <p:nvSpPr>
+          <p:cNvPr id="228" name="Google Shape;228;g22e906c1a5e_0_10:notes"/>
           <p:cNvSpPr txBox="1"/>
           <p:nvPr>
             <p:ph idx="1" type="body"/>
@@ -1757,6 +1862,501 @@
       <p:sp>
         <p:nvSpPr>
           <p:cNvPr id="132" name="Google Shape;132;g22bc7bbcbef_0_119:notes"/>
+          <p:cNvSpPr txBox="1"/>
+          <p:nvPr>
+            <p:ph idx="1" type="body"/>
+          </p:nvPr>
+        </p:nvSpPr>
+        <p:spPr>
+          <a:xfrm>
+            <a:off x="685800" y="4343400"/>
+            <a:ext cx="5486400" cy="4114800"/>
+          </a:xfrm>
+          <a:prstGeom prst="rect">
+            <a:avLst/>
+          </a:prstGeom>
+        </p:spPr>
+        <p:txBody>
+          <a:bodyPr anchorCtr="0" anchor="t" bIns="91425" lIns="91425" spcFirstLastPara="1" rIns="91425" wrap="square" tIns="91425">
+            <a:noAutofit/>
+          </a:bodyPr>
+          <a:lstStyle/>
+          <a:p>
+            <a:pPr indent="0" lvl="0" marL="0" rtl="0" algn="l">
+              <a:spcBef>
+                <a:spcPts val="0"/>
+              </a:spcBef>
+              <a:spcAft>
+                <a:spcPts val="0"/>
+              </a:spcAft>
+              <a:buNone/>
+            </a:pPr>
+            <a:r>
+              <a:t/>
+            </a:r>
+            <a:endParaRPr/>
+          </a:p>
+        </p:txBody>
+      </p:sp>
+    </p:spTree>
+  </p:cSld>
+  <p:clrMapOvr>
+    <a:masterClrMapping/>
+  </p:clrMapOvr>
+</p:notes>
+</file>
+
+<file path=ppt/notesSlides/notesSlide20.xml><?xml version="1.0" encoding="utf-8"?>
+<p:notes xmlns:a="http://schemas.openxmlformats.org/drawingml/2006/main" xmlns:r="http://schemas.openxmlformats.org/officeDocument/2006/relationships" xmlns:mc="http://schemas.openxmlformats.org/markup-compatibility/2006" xmlns:mv="urn:schemas-microsoft-com:mac:vml" xmlns:p="http://schemas.openxmlformats.org/presentationml/2006/main" xmlns:c="http://schemas.openxmlformats.org/drawingml/2006/chart" xmlns:dgm="http://schemas.openxmlformats.org/drawingml/2006/diagram" xmlns:o="urn:schemas-microsoft-com:office:office" xmlns:v="urn:schemas-microsoft-com:vml" xmlns:pvml="urn:schemas-microsoft-com:office:powerpoint" xmlns:com="http://schemas.openxmlformats.org/drawingml/2006/compatibility" xmlns:p14="http://schemas.microsoft.com/office/powerpoint/2010/main" xmlns:p15="http://schemas.microsoft.com/office/powerpoint/2012/main" xmlns:ahyp="http://schemas.microsoft.com/office/drawing/2018/hyperlinkcolor" showMasterPhAnim="0" showMasterSp="0">
+  <p:cSld>
+    <p:spTree>
+      <p:nvGrpSpPr>
+        <p:cNvPr id="231" name="Shape 231"/>
+        <p:cNvGrpSpPr/>
+        <p:nvPr/>
+      </p:nvGrpSpPr>
+      <p:grpSpPr>
+        <a:xfrm>
+          <a:off x="0" y="0"/>
+          <a:ext cx="0" cy="0"/>
+          <a:chOff x="0" y="0"/>
+          <a:chExt cx="0" cy="0"/>
+        </a:xfrm>
+      </p:grpSpPr>
+      <p:sp>
+        <p:nvSpPr>
+          <p:cNvPr id="232" name="Google Shape;232;g22e906c1a5e_0_21:notes"/>
+          <p:cNvSpPr/>
+          <p:nvPr>
+            <p:ph idx="2" type="sldImg"/>
+          </p:nvPr>
+        </p:nvSpPr>
+        <p:spPr>
+          <a:xfrm>
+            <a:off x="381300" y="685800"/>
+            <a:ext cx="6096000" cy="3429000"/>
+          </a:xfrm>
+          <a:custGeom>
+            <a:rect b="b" l="l" r="r" t="t"/>
+            <a:pathLst>
+              <a:path extrusionOk="0" h="120000" w="120000">
+                <a:moveTo>
+                  <a:pt x="0" y="0"/>
+                </a:moveTo>
+                <a:lnTo>
+                  <a:pt x="120000" y="0"/>
+                </a:lnTo>
+                <a:lnTo>
+                  <a:pt x="120000" y="120000"/>
+                </a:lnTo>
+                <a:lnTo>
+                  <a:pt x="0" y="120000"/>
+                </a:lnTo>
+                <a:close/>
+              </a:path>
+            </a:pathLst>
+          </a:custGeom>
+        </p:spPr>
+      </p:sp>
+      <p:sp>
+        <p:nvSpPr>
+          <p:cNvPr id="233" name="Google Shape;233;g22e906c1a5e_0_21:notes"/>
+          <p:cNvSpPr txBox="1"/>
+          <p:nvPr>
+            <p:ph idx="1" type="body"/>
+          </p:nvPr>
+        </p:nvSpPr>
+        <p:spPr>
+          <a:xfrm>
+            <a:off x="685800" y="4343400"/>
+            <a:ext cx="5486400" cy="4114800"/>
+          </a:xfrm>
+          <a:prstGeom prst="rect">
+            <a:avLst/>
+          </a:prstGeom>
+        </p:spPr>
+        <p:txBody>
+          <a:bodyPr anchorCtr="0" anchor="t" bIns="91425" lIns="91425" spcFirstLastPara="1" rIns="91425" wrap="square" tIns="91425">
+            <a:noAutofit/>
+          </a:bodyPr>
+          <a:lstStyle/>
+          <a:p>
+            <a:pPr indent="0" lvl="0" marL="0" rtl="0" algn="l">
+              <a:spcBef>
+                <a:spcPts val="0"/>
+              </a:spcBef>
+              <a:spcAft>
+                <a:spcPts val="0"/>
+              </a:spcAft>
+              <a:buNone/>
+            </a:pPr>
+            <a:r>
+              <a:t/>
+            </a:r>
+            <a:endParaRPr/>
+          </a:p>
+        </p:txBody>
+      </p:sp>
+    </p:spTree>
+  </p:cSld>
+  <p:clrMapOvr>
+    <a:masterClrMapping/>
+  </p:clrMapOvr>
+</p:notes>
+</file>
+
+<file path=ppt/notesSlides/notesSlide21.xml><?xml version="1.0" encoding="utf-8"?>
+<p:notes xmlns:a="http://schemas.openxmlformats.org/drawingml/2006/main" xmlns:r="http://schemas.openxmlformats.org/officeDocument/2006/relationships" xmlns:mc="http://schemas.openxmlformats.org/markup-compatibility/2006" xmlns:mv="urn:schemas-microsoft-com:mac:vml" xmlns:p="http://schemas.openxmlformats.org/presentationml/2006/main" xmlns:c="http://schemas.openxmlformats.org/drawingml/2006/chart" xmlns:dgm="http://schemas.openxmlformats.org/drawingml/2006/diagram" xmlns:o="urn:schemas-microsoft-com:office:office" xmlns:v="urn:schemas-microsoft-com:vml" xmlns:pvml="urn:schemas-microsoft-com:office:powerpoint" xmlns:com="http://schemas.openxmlformats.org/drawingml/2006/compatibility" xmlns:p14="http://schemas.microsoft.com/office/powerpoint/2010/main" xmlns:p15="http://schemas.microsoft.com/office/powerpoint/2012/main" xmlns:ahyp="http://schemas.microsoft.com/office/drawing/2018/hyperlinkcolor" showMasterPhAnim="0" showMasterSp="0">
+  <p:cSld>
+    <p:spTree>
+      <p:nvGrpSpPr>
+        <p:cNvPr id="236" name="Shape 236"/>
+        <p:cNvGrpSpPr/>
+        <p:nvPr/>
+      </p:nvGrpSpPr>
+      <p:grpSpPr>
+        <a:xfrm>
+          <a:off x="0" y="0"/>
+          <a:ext cx="0" cy="0"/>
+          <a:chOff x="0" y="0"/>
+          <a:chExt cx="0" cy="0"/>
+        </a:xfrm>
+      </p:grpSpPr>
+      <p:sp>
+        <p:nvSpPr>
+          <p:cNvPr id="237" name="Google Shape;237;g22e906c1a5e_0_13:notes"/>
+          <p:cNvSpPr/>
+          <p:nvPr>
+            <p:ph idx="2" type="sldImg"/>
+          </p:nvPr>
+        </p:nvSpPr>
+        <p:spPr>
+          <a:xfrm>
+            <a:off x="381300" y="685800"/>
+            <a:ext cx="6096000" cy="3429000"/>
+          </a:xfrm>
+          <a:custGeom>
+            <a:rect b="b" l="l" r="r" t="t"/>
+            <a:pathLst>
+              <a:path extrusionOk="0" h="120000" w="120000">
+                <a:moveTo>
+                  <a:pt x="0" y="0"/>
+                </a:moveTo>
+                <a:lnTo>
+                  <a:pt x="120000" y="0"/>
+                </a:lnTo>
+                <a:lnTo>
+                  <a:pt x="120000" y="120000"/>
+                </a:lnTo>
+                <a:lnTo>
+                  <a:pt x="0" y="120000"/>
+                </a:lnTo>
+                <a:close/>
+              </a:path>
+            </a:pathLst>
+          </a:custGeom>
+        </p:spPr>
+      </p:sp>
+      <p:sp>
+        <p:nvSpPr>
+          <p:cNvPr id="238" name="Google Shape;238;g22e906c1a5e_0_13:notes"/>
+          <p:cNvSpPr txBox="1"/>
+          <p:nvPr>
+            <p:ph idx="1" type="body"/>
+          </p:nvPr>
+        </p:nvSpPr>
+        <p:spPr>
+          <a:xfrm>
+            <a:off x="685800" y="4343400"/>
+            <a:ext cx="5486400" cy="4114800"/>
+          </a:xfrm>
+          <a:prstGeom prst="rect">
+            <a:avLst/>
+          </a:prstGeom>
+        </p:spPr>
+        <p:txBody>
+          <a:bodyPr anchorCtr="0" anchor="t" bIns="91425" lIns="91425" spcFirstLastPara="1" rIns="91425" wrap="square" tIns="91425">
+            <a:noAutofit/>
+          </a:bodyPr>
+          <a:lstStyle/>
+          <a:p>
+            <a:pPr indent="0" lvl="0" marL="0" rtl="0" algn="l">
+              <a:spcBef>
+                <a:spcPts val="0"/>
+              </a:spcBef>
+              <a:spcAft>
+                <a:spcPts val="0"/>
+              </a:spcAft>
+              <a:buNone/>
+            </a:pPr>
+            <a:r>
+              <a:t/>
+            </a:r>
+            <a:endParaRPr/>
+          </a:p>
+        </p:txBody>
+      </p:sp>
+    </p:spTree>
+  </p:cSld>
+  <p:clrMapOvr>
+    <a:masterClrMapping/>
+  </p:clrMapOvr>
+</p:notes>
+</file>
+
+<file path=ppt/notesSlides/notesSlide22.xml><?xml version="1.0" encoding="utf-8"?>
+<p:notes xmlns:a="http://schemas.openxmlformats.org/drawingml/2006/main" xmlns:r="http://schemas.openxmlformats.org/officeDocument/2006/relationships" xmlns:mc="http://schemas.openxmlformats.org/markup-compatibility/2006" xmlns:mv="urn:schemas-microsoft-com:mac:vml" xmlns:p="http://schemas.openxmlformats.org/presentationml/2006/main" xmlns:c="http://schemas.openxmlformats.org/drawingml/2006/chart" xmlns:dgm="http://schemas.openxmlformats.org/drawingml/2006/diagram" xmlns:o="urn:schemas-microsoft-com:office:office" xmlns:v="urn:schemas-microsoft-com:vml" xmlns:pvml="urn:schemas-microsoft-com:office:powerpoint" xmlns:com="http://schemas.openxmlformats.org/drawingml/2006/compatibility" xmlns:p14="http://schemas.microsoft.com/office/powerpoint/2010/main" xmlns:p15="http://schemas.microsoft.com/office/powerpoint/2012/main" xmlns:ahyp="http://schemas.microsoft.com/office/drawing/2018/hyperlinkcolor" showMasterPhAnim="0" showMasterSp="0">
+  <p:cSld>
+    <p:spTree>
+      <p:nvGrpSpPr>
+        <p:cNvPr id="241" name="Shape 241"/>
+        <p:cNvGrpSpPr/>
+        <p:nvPr/>
+      </p:nvGrpSpPr>
+      <p:grpSpPr>
+        <a:xfrm>
+          <a:off x="0" y="0"/>
+          <a:ext cx="0" cy="0"/>
+          <a:chOff x="0" y="0"/>
+          <a:chExt cx="0" cy="0"/>
+        </a:xfrm>
+      </p:grpSpPr>
+      <p:sp>
+        <p:nvSpPr>
+          <p:cNvPr id="242" name="Google Shape;242;g22e906c1a5e_0_18:notes"/>
+          <p:cNvSpPr/>
+          <p:nvPr>
+            <p:ph idx="2" type="sldImg"/>
+          </p:nvPr>
+        </p:nvSpPr>
+        <p:spPr>
+          <a:xfrm>
+            <a:off x="381300" y="685800"/>
+            <a:ext cx="6096000" cy="3429000"/>
+          </a:xfrm>
+          <a:custGeom>
+            <a:rect b="b" l="l" r="r" t="t"/>
+            <a:pathLst>
+              <a:path extrusionOk="0" h="120000" w="120000">
+                <a:moveTo>
+                  <a:pt x="0" y="0"/>
+                </a:moveTo>
+                <a:lnTo>
+                  <a:pt x="120000" y="0"/>
+                </a:lnTo>
+                <a:lnTo>
+                  <a:pt x="120000" y="120000"/>
+                </a:lnTo>
+                <a:lnTo>
+                  <a:pt x="0" y="120000"/>
+                </a:lnTo>
+                <a:close/>
+              </a:path>
+            </a:pathLst>
+          </a:custGeom>
+        </p:spPr>
+      </p:sp>
+      <p:sp>
+        <p:nvSpPr>
+          <p:cNvPr id="243" name="Google Shape;243;g22e906c1a5e_0_18:notes"/>
+          <p:cNvSpPr txBox="1"/>
+          <p:nvPr>
+            <p:ph idx="1" type="body"/>
+          </p:nvPr>
+        </p:nvSpPr>
+        <p:spPr>
+          <a:xfrm>
+            <a:off x="685800" y="4343400"/>
+            <a:ext cx="5486400" cy="4114800"/>
+          </a:xfrm>
+          <a:prstGeom prst="rect">
+            <a:avLst/>
+          </a:prstGeom>
+        </p:spPr>
+        <p:txBody>
+          <a:bodyPr anchorCtr="0" anchor="t" bIns="91425" lIns="91425" spcFirstLastPara="1" rIns="91425" wrap="square" tIns="91425">
+            <a:noAutofit/>
+          </a:bodyPr>
+          <a:lstStyle/>
+          <a:p>
+            <a:pPr indent="0" lvl="0" marL="0" rtl="0" algn="l">
+              <a:spcBef>
+                <a:spcPts val="0"/>
+              </a:spcBef>
+              <a:spcAft>
+                <a:spcPts val="0"/>
+              </a:spcAft>
+              <a:buNone/>
+            </a:pPr>
+            <a:r>
+              <a:t/>
+            </a:r>
+            <a:endParaRPr/>
+          </a:p>
+        </p:txBody>
+      </p:sp>
+    </p:spTree>
+  </p:cSld>
+  <p:clrMapOvr>
+    <a:masterClrMapping/>
+  </p:clrMapOvr>
+</p:notes>
+</file>
+
+<file path=ppt/notesSlides/notesSlide23.xml><?xml version="1.0" encoding="utf-8"?>
+<p:notes xmlns:a="http://schemas.openxmlformats.org/drawingml/2006/main" xmlns:r="http://schemas.openxmlformats.org/officeDocument/2006/relationships" xmlns:mc="http://schemas.openxmlformats.org/markup-compatibility/2006" xmlns:mv="urn:schemas-microsoft-com:mac:vml" xmlns:p="http://schemas.openxmlformats.org/presentationml/2006/main" xmlns:c="http://schemas.openxmlformats.org/drawingml/2006/chart" xmlns:dgm="http://schemas.openxmlformats.org/drawingml/2006/diagram" xmlns:o="urn:schemas-microsoft-com:office:office" xmlns:v="urn:schemas-microsoft-com:vml" xmlns:pvml="urn:schemas-microsoft-com:office:powerpoint" xmlns:com="http://schemas.openxmlformats.org/drawingml/2006/compatibility" xmlns:p14="http://schemas.microsoft.com/office/powerpoint/2010/main" xmlns:p15="http://schemas.microsoft.com/office/powerpoint/2012/main" xmlns:ahyp="http://schemas.microsoft.com/office/drawing/2018/hyperlinkcolor" showMasterPhAnim="0" showMasterSp="0">
+  <p:cSld>
+    <p:spTree>
+      <p:nvGrpSpPr>
+        <p:cNvPr id="246" name="Shape 246"/>
+        <p:cNvGrpSpPr/>
+        <p:nvPr/>
+      </p:nvGrpSpPr>
+      <p:grpSpPr>
+        <a:xfrm>
+          <a:off x="0" y="0"/>
+          <a:ext cx="0" cy="0"/>
+          <a:chOff x="0" y="0"/>
+          <a:chExt cx="0" cy="0"/>
+        </a:xfrm>
+      </p:grpSpPr>
+      <p:sp>
+        <p:nvSpPr>
+          <p:cNvPr id="247" name="Google Shape;247;g22bc7bbcbef_0_124:notes"/>
+          <p:cNvSpPr/>
+          <p:nvPr>
+            <p:ph idx="2" type="sldImg"/>
+          </p:nvPr>
+        </p:nvSpPr>
+        <p:spPr>
+          <a:xfrm>
+            <a:off x="381300" y="685800"/>
+            <a:ext cx="6096000" cy="3429000"/>
+          </a:xfrm>
+          <a:custGeom>
+            <a:rect b="b" l="l" r="r" t="t"/>
+            <a:pathLst>
+              <a:path extrusionOk="0" h="120000" w="120000">
+                <a:moveTo>
+                  <a:pt x="0" y="0"/>
+                </a:moveTo>
+                <a:lnTo>
+                  <a:pt x="120000" y="0"/>
+                </a:lnTo>
+                <a:lnTo>
+                  <a:pt x="120000" y="120000"/>
+                </a:lnTo>
+                <a:lnTo>
+                  <a:pt x="0" y="120000"/>
+                </a:lnTo>
+                <a:close/>
+              </a:path>
+            </a:pathLst>
+          </a:custGeom>
+        </p:spPr>
+      </p:sp>
+      <p:sp>
+        <p:nvSpPr>
+          <p:cNvPr id="248" name="Google Shape;248;g22bc7bbcbef_0_124:notes"/>
+          <p:cNvSpPr txBox="1"/>
+          <p:nvPr>
+            <p:ph idx="1" type="body"/>
+          </p:nvPr>
+        </p:nvSpPr>
+        <p:spPr>
+          <a:xfrm>
+            <a:off x="685800" y="4343400"/>
+            <a:ext cx="5486400" cy="4114800"/>
+          </a:xfrm>
+          <a:prstGeom prst="rect">
+            <a:avLst/>
+          </a:prstGeom>
+        </p:spPr>
+        <p:txBody>
+          <a:bodyPr anchorCtr="0" anchor="t" bIns="91425" lIns="91425" spcFirstLastPara="1" rIns="91425" wrap="square" tIns="91425">
+            <a:noAutofit/>
+          </a:bodyPr>
+          <a:lstStyle/>
+          <a:p>
+            <a:pPr indent="0" lvl="0" marL="0" rtl="0" algn="l">
+              <a:spcBef>
+                <a:spcPts val="0"/>
+              </a:spcBef>
+              <a:spcAft>
+                <a:spcPts val="0"/>
+              </a:spcAft>
+              <a:buNone/>
+            </a:pPr>
+            <a:r>
+              <a:t/>
+            </a:r>
+            <a:endParaRPr/>
+          </a:p>
+        </p:txBody>
+      </p:sp>
+    </p:spTree>
+  </p:cSld>
+  <p:clrMapOvr>
+    <a:masterClrMapping/>
+  </p:clrMapOvr>
+</p:notes>
+</file>
+
+<file path=ppt/notesSlides/notesSlide24.xml><?xml version="1.0" encoding="utf-8"?>
+<p:notes xmlns:a="http://schemas.openxmlformats.org/drawingml/2006/main" xmlns:r="http://schemas.openxmlformats.org/officeDocument/2006/relationships" xmlns:mc="http://schemas.openxmlformats.org/markup-compatibility/2006" xmlns:mv="urn:schemas-microsoft-com:mac:vml" xmlns:p="http://schemas.openxmlformats.org/presentationml/2006/main" xmlns:c="http://schemas.openxmlformats.org/drawingml/2006/chart" xmlns:dgm="http://schemas.openxmlformats.org/drawingml/2006/diagram" xmlns:o="urn:schemas-microsoft-com:office:office" xmlns:v="urn:schemas-microsoft-com:vml" xmlns:pvml="urn:schemas-microsoft-com:office:powerpoint" xmlns:com="http://schemas.openxmlformats.org/drawingml/2006/compatibility" xmlns:p14="http://schemas.microsoft.com/office/powerpoint/2010/main" xmlns:p15="http://schemas.microsoft.com/office/powerpoint/2012/main" xmlns:ahyp="http://schemas.microsoft.com/office/drawing/2018/hyperlinkcolor" showMasterPhAnim="0" showMasterSp="0">
+  <p:cSld>
+    <p:spTree>
+      <p:nvGrpSpPr>
+        <p:cNvPr id="252" name="Shape 252"/>
+        <p:cNvGrpSpPr/>
+        <p:nvPr/>
+      </p:nvGrpSpPr>
+      <p:grpSpPr>
+        <a:xfrm>
+          <a:off x="0" y="0"/>
+          <a:ext cx="0" cy="0"/>
+          <a:chOff x="0" y="0"/>
+          <a:chExt cx="0" cy="0"/>
+        </a:xfrm>
+      </p:grpSpPr>
+      <p:sp>
+        <p:nvSpPr>
+          <p:cNvPr id="253" name="Google Shape;253;g22bc7bbcbef_0_129:notes"/>
+          <p:cNvSpPr/>
+          <p:nvPr>
+            <p:ph idx="2" type="sldImg"/>
+          </p:nvPr>
+        </p:nvSpPr>
+        <p:spPr>
+          <a:xfrm>
+            <a:off x="381300" y="685800"/>
+            <a:ext cx="6096000" cy="3429000"/>
+          </a:xfrm>
+          <a:custGeom>
+            <a:rect b="b" l="l" r="r" t="t"/>
+            <a:pathLst>
+              <a:path extrusionOk="0" h="120000" w="120000">
+                <a:moveTo>
+                  <a:pt x="0" y="0"/>
+                </a:moveTo>
+                <a:lnTo>
+                  <a:pt x="120000" y="0"/>
+                </a:lnTo>
+                <a:lnTo>
+                  <a:pt x="120000" y="120000"/>
+                </a:lnTo>
+                <a:lnTo>
+                  <a:pt x="0" y="120000"/>
+                </a:lnTo>
+                <a:close/>
+              </a:path>
+            </a:pathLst>
+          </a:custGeom>
+        </p:spPr>
+      </p:sp>
+      <p:sp>
+        <p:nvSpPr>
+          <p:cNvPr id="254" name="Google Shape;254;g22bc7bbcbef_0_129:notes"/>
           <p:cNvSpPr txBox="1"/>
           <p:nvPr>
             <p:ph idx="1" type="body"/>
@@ -12041,301 +12641,34 @@
           <a:chExt cx="0" cy="0"/>
         </a:xfrm>
       </p:grpSpPr>
-      <p:sp>
-        <p:nvSpPr>
+      <p:pic>
+        <p:nvPicPr>
           <p:cNvPr id="220" name="Google Shape;220;p29"/>
-          <p:cNvSpPr txBox="1"/>
-          <p:nvPr>
-            <p:ph type="title"/>
-          </p:nvPr>
-        </p:nvSpPr>
+          <p:cNvPicPr preferRelativeResize="0"/>
+          <p:nvPr/>
+        </p:nvPicPr>
+        <p:blipFill>
+          <a:blip r:embed="rId3">
+            <a:alphaModFix/>
+          </a:blip>
+          <a:stretch>
+            <a:fillRect/>
+          </a:stretch>
+        </p:blipFill>
         <p:spPr>
           <a:xfrm>
-            <a:off x="819150" y="845600"/>
-            <a:ext cx="7505700" cy="954600"/>
+            <a:off x="152400" y="152400"/>
+            <a:ext cx="8463451" cy="4838700"/>
           </a:xfrm>
           <a:prstGeom prst="rect">
             <a:avLst/>
           </a:prstGeom>
+          <a:noFill/>
+          <a:ln>
+            <a:noFill/>
+          </a:ln>
         </p:spPr>
-        <p:txBody>
-          <a:bodyPr anchorCtr="0" anchor="t" bIns="91425" lIns="91425" spcFirstLastPara="1" rIns="91425" wrap="square" tIns="91425">
-            <a:normAutofit/>
-          </a:bodyPr>
-          <a:lstStyle/>
-          <a:p>
-            <a:pPr indent="0" lvl="0" marL="0" rtl="0" algn="l">
-              <a:spcBef>
-                <a:spcPts val="0"/>
-              </a:spcBef>
-              <a:spcAft>
-                <a:spcPts val="0"/>
-              </a:spcAft>
-              <a:buNone/>
-            </a:pPr>
-            <a:r>
-              <a:rPr lang="en"/>
-              <a:t>Resources</a:t>
-            </a:r>
-            <a:endParaRPr/>
-          </a:p>
-        </p:txBody>
-      </p:sp>
-      <p:sp>
-        <p:nvSpPr>
-          <p:cNvPr id="221" name="Google Shape;221;p29"/>
-          <p:cNvSpPr txBox="1"/>
-          <p:nvPr>
-            <p:ph idx="1" type="body"/>
-          </p:nvPr>
-        </p:nvSpPr>
-        <p:spPr>
-          <a:xfrm>
-            <a:off x="819150" y="1990725"/>
-            <a:ext cx="7505700" cy="2448000"/>
-          </a:xfrm>
-          <a:prstGeom prst="rect">
-            <a:avLst/>
-          </a:prstGeom>
-        </p:spPr>
-        <p:txBody>
-          <a:bodyPr anchorCtr="0" anchor="t" bIns="91425" lIns="91425" spcFirstLastPara="1" rIns="91425" wrap="square" tIns="91425">
-            <a:normAutofit fontScale="77500" lnSpcReduction="20000"/>
-          </a:bodyPr>
-          <a:lstStyle/>
-          <a:p>
-            <a:pPr indent="0" lvl="0" marL="0" rtl="0" algn="l">
-              <a:lnSpc>
-                <a:spcPct val="140000"/>
-              </a:lnSpc>
-              <a:spcBef>
-                <a:spcPts val="900"/>
-              </a:spcBef>
-              <a:spcAft>
-                <a:spcPts val="0"/>
-              </a:spcAft>
-              <a:buNone/>
-            </a:pPr>
-            <a:r>
-              <a:rPr b="1" lang="en" sz="1800" u="sng">
-                <a:solidFill>
-                  <a:schemeClr val="hlink"/>
-                </a:solidFill>
-                <a:latin typeface="Meiryo"/>
-                <a:ea typeface="Meiryo"/>
-                <a:cs typeface="Meiryo"/>
-                <a:sym typeface="Meiryo"/>
-                <a:hlinkClick r:id="rId3"/>
-              </a:rPr>
-              <a:t>https://learndjango.com/tutorials/django-signup-tutorial</a:t>
-            </a:r>
-            <a:endParaRPr b="1" sz="1800" u="sng">
-              <a:solidFill>
-                <a:schemeClr val="hlink"/>
-              </a:solidFill>
-              <a:latin typeface="Meiryo"/>
-              <a:ea typeface="Meiryo"/>
-              <a:cs typeface="Meiryo"/>
-              <a:sym typeface="Meiryo"/>
-            </a:endParaRPr>
-          </a:p>
-          <a:p>
-            <a:pPr indent="0" lvl="0" marL="0" rtl="0" algn="l">
-              <a:lnSpc>
-                <a:spcPct val="140000"/>
-              </a:lnSpc>
-              <a:spcBef>
-                <a:spcPts val="900"/>
-              </a:spcBef>
-              <a:spcAft>
-                <a:spcPts val="0"/>
-              </a:spcAft>
-              <a:buNone/>
-            </a:pPr>
-            <a:r>
-              <a:rPr b="1" lang="en" sz="1800" u="sng">
-                <a:solidFill>
-                  <a:schemeClr val="hlink"/>
-                </a:solidFill>
-                <a:latin typeface="Meiryo"/>
-                <a:ea typeface="Meiryo"/>
-                <a:cs typeface="Meiryo"/>
-                <a:sym typeface="Meiryo"/>
-                <a:hlinkClick r:id="rId4"/>
-              </a:rPr>
-              <a:t>https://learndjango.com/tutorials/django-login-and-logout-tutorial</a:t>
-            </a:r>
-            <a:endParaRPr b="1" sz="1800" u="sng">
-              <a:solidFill>
-                <a:schemeClr val="hlink"/>
-              </a:solidFill>
-              <a:latin typeface="Meiryo"/>
-              <a:ea typeface="Meiryo"/>
-              <a:cs typeface="Meiryo"/>
-              <a:sym typeface="Meiryo"/>
-            </a:endParaRPr>
-          </a:p>
-          <a:p>
-            <a:pPr indent="0" lvl="0" marL="0" rtl="0" algn="l">
-              <a:lnSpc>
-                <a:spcPct val="140000"/>
-              </a:lnSpc>
-              <a:spcBef>
-                <a:spcPts val="900"/>
-              </a:spcBef>
-              <a:spcAft>
-                <a:spcPts val="0"/>
-              </a:spcAft>
-              <a:buNone/>
-            </a:pPr>
-            <a:r>
-              <a:rPr b="1" lang="en" sz="1800" u="sng">
-                <a:solidFill>
-                  <a:schemeClr val="hlink"/>
-                </a:solidFill>
-                <a:latin typeface="Meiryo"/>
-                <a:ea typeface="Meiryo"/>
-                <a:cs typeface="Meiryo"/>
-                <a:sym typeface="Meiryo"/>
-                <a:hlinkClick r:id="rId5"/>
-              </a:rPr>
-              <a:t>https://getbootstrap.com/docs/5.3/getting-started/introduction/</a:t>
-            </a:r>
-            <a:endParaRPr b="1" sz="1800" u="sng">
-              <a:solidFill>
-                <a:schemeClr val="hlink"/>
-              </a:solidFill>
-              <a:latin typeface="Meiryo"/>
-              <a:ea typeface="Meiryo"/>
-              <a:cs typeface="Meiryo"/>
-              <a:sym typeface="Meiryo"/>
-            </a:endParaRPr>
-          </a:p>
-          <a:p>
-            <a:pPr indent="0" lvl="0" marL="0" rtl="0" algn="l">
-              <a:lnSpc>
-                <a:spcPct val="140000"/>
-              </a:lnSpc>
-              <a:spcBef>
-                <a:spcPts val="900"/>
-              </a:spcBef>
-              <a:spcAft>
-                <a:spcPts val="0"/>
-              </a:spcAft>
-              <a:buNone/>
-            </a:pPr>
-            <a:r>
-              <a:rPr b="1" lang="en" sz="1800" u="sng">
-                <a:solidFill>
-                  <a:schemeClr val="hlink"/>
-                </a:solidFill>
-                <a:latin typeface="Meiryo"/>
-                <a:ea typeface="Meiryo"/>
-                <a:cs typeface="Meiryo"/>
-                <a:sym typeface="Meiryo"/>
-                <a:hlinkClick r:id="rId6"/>
-              </a:rPr>
-              <a:t>https://docs.djangoproject.com/en/4.2/</a:t>
-            </a:r>
-            <a:endParaRPr b="1" sz="1800" u="sng">
-              <a:solidFill>
-                <a:schemeClr val="hlink"/>
-              </a:solidFill>
-              <a:latin typeface="Meiryo"/>
-              <a:ea typeface="Meiryo"/>
-              <a:cs typeface="Meiryo"/>
-              <a:sym typeface="Meiryo"/>
-            </a:endParaRPr>
-          </a:p>
-          <a:p>
-            <a:pPr indent="0" lvl="0" marL="0" rtl="0" algn="l">
-              <a:lnSpc>
-                <a:spcPct val="140000"/>
-              </a:lnSpc>
-              <a:spcBef>
-                <a:spcPts val="900"/>
-              </a:spcBef>
-              <a:spcAft>
-                <a:spcPts val="0"/>
-              </a:spcAft>
-              <a:buNone/>
-            </a:pPr>
-            <a:r>
-              <a:rPr b="1" lang="en" sz="1800" u="sng">
-                <a:solidFill>
-                  <a:schemeClr val="hlink"/>
-                </a:solidFill>
-                <a:latin typeface="Meiryo"/>
-                <a:ea typeface="Meiryo"/>
-                <a:cs typeface="Meiryo"/>
-                <a:sym typeface="Meiryo"/>
-                <a:hlinkClick r:id="rId7"/>
-              </a:rPr>
-              <a:t>https://mdbootstrap.com/docs/standard/navigation/navbar/</a:t>
-            </a:r>
-            <a:endParaRPr b="1" sz="1800" u="sng">
-              <a:solidFill>
-                <a:schemeClr val="hlink"/>
-              </a:solidFill>
-              <a:latin typeface="Meiryo"/>
-              <a:ea typeface="Meiryo"/>
-              <a:cs typeface="Meiryo"/>
-              <a:sym typeface="Meiryo"/>
-            </a:endParaRPr>
-          </a:p>
-          <a:p>
-            <a:pPr indent="0" lvl="0" marL="0" rtl="0" algn="l">
-              <a:lnSpc>
-                <a:spcPct val="140000"/>
-              </a:lnSpc>
-              <a:spcBef>
-                <a:spcPts val="900"/>
-              </a:spcBef>
-              <a:spcAft>
-                <a:spcPts val="0"/>
-              </a:spcAft>
-              <a:buNone/>
-            </a:pPr>
-            <a:r>
-              <a:rPr b="1" lang="en" sz="1800" u="sng">
-                <a:solidFill>
-                  <a:schemeClr val="hlink"/>
-                </a:solidFill>
-                <a:latin typeface="Meiryo"/>
-                <a:ea typeface="Meiryo"/>
-                <a:cs typeface="Meiryo"/>
-                <a:sym typeface="Meiryo"/>
-                <a:hlinkClick r:id="rId8"/>
-              </a:rPr>
-              <a:t>https://www.w3schools.com/django/</a:t>
-            </a:r>
-            <a:endParaRPr b="1" sz="1800" u="sng">
-              <a:solidFill>
-                <a:schemeClr val="hlink"/>
-              </a:solidFill>
-              <a:latin typeface="Meiryo"/>
-              <a:ea typeface="Meiryo"/>
-              <a:cs typeface="Meiryo"/>
-              <a:sym typeface="Meiryo"/>
-            </a:endParaRPr>
-          </a:p>
-          <a:p>
-            <a:pPr indent="0" lvl="0" marL="0" rtl="0" algn="l">
-              <a:spcBef>
-                <a:spcPts val="0"/>
-              </a:spcBef>
-              <a:spcAft>
-                <a:spcPts val="1200"/>
-              </a:spcAft>
-              <a:buNone/>
-            </a:pPr>
-            <a:r>
-              <a:t/>
-            </a:r>
-            <a:endParaRPr/>
-          </a:p>
-        </p:txBody>
-      </p:sp>
+      </p:pic>
     </p:spTree>
   </p:cSld>
   <p:clrMapOvr>
@@ -12349,7 +12682,7 @@
   <p:cSld>
     <p:spTree>
       <p:nvGrpSpPr>
-        <p:cNvPr id="225" name="Shape 225"/>
+        <p:cNvPr id="224" name="Shape 224"/>
         <p:cNvGrpSpPr/>
         <p:nvPr/>
       </p:nvGrpSpPr>
@@ -12361,50 +12694,87 @@
           <a:chExt cx="0" cy="0"/>
         </a:xfrm>
       </p:grpSpPr>
-      <p:sp>
-        <p:nvSpPr>
-          <p:cNvPr id="226" name="Google Shape;226;p30"/>
-          <p:cNvSpPr txBox="1"/>
-          <p:nvPr>
-            <p:ph type="title"/>
-          </p:nvPr>
-        </p:nvSpPr>
+      <p:pic>
+        <p:nvPicPr>
+          <p:cNvPr id="225" name="Google Shape;225;p30"/>
+          <p:cNvPicPr preferRelativeResize="0"/>
+          <p:nvPr/>
+        </p:nvPicPr>
+        <p:blipFill>
+          <a:blip r:embed="rId3">
+            <a:alphaModFix/>
+          </a:blip>
+          <a:stretch>
+            <a:fillRect/>
+          </a:stretch>
+        </p:blipFill>
         <p:spPr>
           <a:xfrm>
-            <a:off x="1888684" y="1746100"/>
-            <a:ext cx="5377500" cy="1646100"/>
+            <a:off x="152400" y="152400"/>
+            <a:ext cx="8170540" cy="4838701"/>
           </a:xfrm>
           <a:prstGeom prst="rect">
             <a:avLst/>
           </a:prstGeom>
+          <a:noFill/>
+          <a:ln>
+            <a:noFill/>
+          </a:ln>
         </p:spPr>
-        <p:txBody>
-          <a:bodyPr anchorCtr="0" anchor="ctr" bIns="91425" lIns="91425" spcFirstLastPara="1" rIns="91425" wrap="square" tIns="91425">
-            <a:normAutofit/>
-          </a:bodyPr>
-          <a:lstStyle/>
-          <a:p>
-            <a:pPr indent="0" lvl="0" marL="0" rtl="0" algn="ctr">
-              <a:spcBef>
-                <a:spcPts val="0"/>
-              </a:spcBef>
-              <a:spcAft>
-                <a:spcPts val="0"/>
-              </a:spcAft>
-              <a:buNone/>
-            </a:pPr>
-            <a:r>
-              <a:rPr lang="en"/>
-              <a:t>Questions</a:t>
-            </a:r>
-            <a:r>
-              <a:rPr lang="en"/>
-              <a:t>?</a:t>
-            </a:r>
-            <a:endParaRPr/>
-          </a:p>
-        </p:txBody>
-      </p:sp>
+      </p:pic>
+    </p:spTree>
+  </p:cSld>
+  <p:clrMapOvr>
+    <a:masterClrMapping/>
+  </p:clrMapOvr>
+</p:sld>
+</file>
+
+<file path=ppt/slides/slide19.xml><?xml version="1.0" encoding="utf-8"?>
+<p:sld xmlns:a="http://schemas.openxmlformats.org/drawingml/2006/main" xmlns:r="http://schemas.openxmlformats.org/officeDocument/2006/relationships" xmlns:mc="http://schemas.openxmlformats.org/markup-compatibility/2006" xmlns:mv="urn:schemas-microsoft-com:mac:vml" xmlns:p="http://schemas.openxmlformats.org/presentationml/2006/main" xmlns:c="http://schemas.openxmlformats.org/drawingml/2006/chart" xmlns:dgm="http://schemas.openxmlformats.org/drawingml/2006/diagram" xmlns:o="urn:schemas-microsoft-com:office:office" xmlns:v="urn:schemas-microsoft-com:vml" xmlns:pvml="urn:schemas-microsoft-com:office:powerpoint" xmlns:com="http://schemas.openxmlformats.org/drawingml/2006/compatibility" xmlns:p14="http://schemas.microsoft.com/office/powerpoint/2010/main" xmlns:p15="http://schemas.microsoft.com/office/powerpoint/2012/main" xmlns:ahyp="http://schemas.microsoft.com/office/drawing/2018/hyperlinkcolor">
+  <p:cSld>
+    <p:spTree>
+      <p:nvGrpSpPr>
+        <p:cNvPr id="229" name="Shape 229"/>
+        <p:cNvGrpSpPr/>
+        <p:nvPr/>
+      </p:nvGrpSpPr>
+      <p:grpSpPr>
+        <a:xfrm>
+          <a:off x="0" y="0"/>
+          <a:ext cx="0" cy="0"/>
+          <a:chOff x="0" y="0"/>
+          <a:chExt cx="0" cy="0"/>
+        </a:xfrm>
+      </p:grpSpPr>
+      <p:pic>
+        <p:nvPicPr>
+          <p:cNvPr id="230" name="Google Shape;230;p31"/>
+          <p:cNvPicPr preferRelativeResize="0"/>
+          <p:nvPr/>
+        </p:nvPicPr>
+        <p:blipFill>
+          <a:blip r:embed="rId3">
+            <a:alphaModFix/>
+          </a:blip>
+          <a:stretch>
+            <a:fillRect/>
+          </a:stretch>
+        </p:blipFill>
+        <p:spPr>
+          <a:xfrm>
+            <a:off x="152400" y="152400"/>
+            <a:ext cx="8308114" cy="4838700"/>
+          </a:xfrm>
+          <a:prstGeom prst="rect">
+            <a:avLst/>
+          </a:prstGeom>
+          <a:noFill/>
+          <a:ln>
+            <a:noFill/>
+          </a:ln>
+        </p:spPr>
+      </p:pic>
     </p:spTree>
   </p:cSld>
   <p:clrMapOvr>
@@ -12591,6 +12961,554 @@
               <a:t>Low - Economy cars</a:t>
             </a:r>
             <a:endParaRPr sz="1600"/>
+          </a:p>
+        </p:txBody>
+      </p:sp>
+    </p:spTree>
+  </p:cSld>
+  <p:clrMapOvr>
+    <a:masterClrMapping/>
+  </p:clrMapOvr>
+</p:sld>
+</file>
+
+<file path=ppt/slides/slide20.xml><?xml version="1.0" encoding="utf-8"?>
+<p:sld xmlns:a="http://schemas.openxmlformats.org/drawingml/2006/main" xmlns:r="http://schemas.openxmlformats.org/officeDocument/2006/relationships" xmlns:mc="http://schemas.openxmlformats.org/markup-compatibility/2006" xmlns:mv="urn:schemas-microsoft-com:mac:vml" xmlns:p="http://schemas.openxmlformats.org/presentationml/2006/main" xmlns:c="http://schemas.openxmlformats.org/drawingml/2006/chart" xmlns:dgm="http://schemas.openxmlformats.org/drawingml/2006/diagram" xmlns:o="urn:schemas-microsoft-com:office:office" xmlns:v="urn:schemas-microsoft-com:vml" xmlns:pvml="urn:schemas-microsoft-com:office:powerpoint" xmlns:com="http://schemas.openxmlformats.org/drawingml/2006/compatibility" xmlns:p14="http://schemas.microsoft.com/office/powerpoint/2010/main" xmlns:p15="http://schemas.microsoft.com/office/powerpoint/2012/main" xmlns:ahyp="http://schemas.microsoft.com/office/drawing/2018/hyperlinkcolor">
+  <p:cSld>
+    <p:spTree>
+      <p:nvGrpSpPr>
+        <p:cNvPr id="234" name="Shape 234"/>
+        <p:cNvGrpSpPr/>
+        <p:nvPr/>
+      </p:nvGrpSpPr>
+      <p:grpSpPr>
+        <a:xfrm>
+          <a:off x="0" y="0"/>
+          <a:ext cx="0" cy="0"/>
+          <a:chOff x="0" y="0"/>
+          <a:chExt cx="0" cy="0"/>
+        </a:xfrm>
+      </p:grpSpPr>
+      <p:pic>
+        <p:nvPicPr>
+          <p:cNvPr id="235" name="Google Shape;235;p32"/>
+          <p:cNvPicPr preferRelativeResize="0"/>
+          <p:nvPr/>
+        </p:nvPicPr>
+        <p:blipFill>
+          <a:blip r:embed="rId3">
+            <a:alphaModFix/>
+          </a:blip>
+          <a:stretch>
+            <a:fillRect/>
+          </a:stretch>
+        </p:blipFill>
+        <p:spPr>
+          <a:xfrm>
+            <a:off x="152400" y="152400"/>
+            <a:ext cx="8392119" cy="4838700"/>
+          </a:xfrm>
+          <a:prstGeom prst="rect">
+            <a:avLst/>
+          </a:prstGeom>
+          <a:noFill/>
+          <a:ln>
+            <a:noFill/>
+          </a:ln>
+        </p:spPr>
+      </p:pic>
+    </p:spTree>
+  </p:cSld>
+  <p:clrMapOvr>
+    <a:masterClrMapping/>
+  </p:clrMapOvr>
+</p:sld>
+</file>
+
+<file path=ppt/slides/slide21.xml><?xml version="1.0" encoding="utf-8"?>
+<p:sld xmlns:a="http://schemas.openxmlformats.org/drawingml/2006/main" xmlns:r="http://schemas.openxmlformats.org/officeDocument/2006/relationships" xmlns:mc="http://schemas.openxmlformats.org/markup-compatibility/2006" xmlns:mv="urn:schemas-microsoft-com:mac:vml" xmlns:p="http://schemas.openxmlformats.org/presentationml/2006/main" xmlns:c="http://schemas.openxmlformats.org/drawingml/2006/chart" xmlns:dgm="http://schemas.openxmlformats.org/drawingml/2006/diagram" xmlns:o="urn:schemas-microsoft-com:office:office" xmlns:v="urn:schemas-microsoft-com:vml" xmlns:pvml="urn:schemas-microsoft-com:office:powerpoint" xmlns:com="http://schemas.openxmlformats.org/drawingml/2006/compatibility" xmlns:p14="http://schemas.microsoft.com/office/powerpoint/2010/main" xmlns:p15="http://schemas.microsoft.com/office/powerpoint/2012/main" xmlns:ahyp="http://schemas.microsoft.com/office/drawing/2018/hyperlinkcolor">
+  <p:cSld>
+    <p:spTree>
+      <p:nvGrpSpPr>
+        <p:cNvPr id="239" name="Shape 239"/>
+        <p:cNvGrpSpPr/>
+        <p:nvPr/>
+      </p:nvGrpSpPr>
+      <p:grpSpPr>
+        <a:xfrm>
+          <a:off x="0" y="0"/>
+          <a:ext cx="0" cy="0"/>
+          <a:chOff x="0" y="0"/>
+          <a:chExt cx="0" cy="0"/>
+        </a:xfrm>
+      </p:grpSpPr>
+      <p:pic>
+        <p:nvPicPr>
+          <p:cNvPr id="240" name="Google Shape;240;p33"/>
+          <p:cNvPicPr preferRelativeResize="0"/>
+          <p:nvPr/>
+        </p:nvPicPr>
+        <p:blipFill>
+          <a:blip r:embed="rId3">
+            <a:alphaModFix/>
+          </a:blip>
+          <a:stretch>
+            <a:fillRect/>
+          </a:stretch>
+        </p:blipFill>
+        <p:spPr>
+          <a:xfrm>
+            <a:off x="152400" y="152400"/>
+            <a:ext cx="8318875" cy="4838700"/>
+          </a:xfrm>
+          <a:prstGeom prst="rect">
+            <a:avLst/>
+          </a:prstGeom>
+          <a:noFill/>
+          <a:ln>
+            <a:noFill/>
+          </a:ln>
+        </p:spPr>
+      </p:pic>
+    </p:spTree>
+  </p:cSld>
+  <p:clrMapOvr>
+    <a:masterClrMapping/>
+  </p:clrMapOvr>
+</p:sld>
+</file>
+
+<file path=ppt/slides/slide22.xml><?xml version="1.0" encoding="utf-8"?>
+<p:sld xmlns:a="http://schemas.openxmlformats.org/drawingml/2006/main" xmlns:r="http://schemas.openxmlformats.org/officeDocument/2006/relationships" xmlns:mc="http://schemas.openxmlformats.org/markup-compatibility/2006" xmlns:mv="urn:schemas-microsoft-com:mac:vml" xmlns:p="http://schemas.openxmlformats.org/presentationml/2006/main" xmlns:c="http://schemas.openxmlformats.org/drawingml/2006/chart" xmlns:dgm="http://schemas.openxmlformats.org/drawingml/2006/diagram" xmlns:o="urn:schemas-microsoft-com:office:office" xmlns:v="urn:schemas-microsoft-com:vml" xmlns:pvml="urn:schemas-microsoft-com:office:powerpoint" xmlns:com="http://schemas.openxmlformats.org/drawingml/2006/compatibility" xmlns:p14="http://schemas.microsoft.com/office/powerpoint/2010/main" xmlns:p15="http://schemas.microsoft.com/office/powerpoint/2012/main" xmlns:ahyp="http://schemas.microsoft.com/office/drawing/2018/hyperlinkcolor">
+  <p:cSld>
+    <p:spTree>
+      <p:nvGrpSpPr>
+        <p:cNvPr id="244" name="Shape 244"/>
+        <p:cNvGrpSpPr/>
+        <p:nvPr/>
+      </p:nvGrpSpPr>
+      <p:grpSpPr>
+        <a:xfrm>
+          <a:off x="0" y="0"/>
+          <a:ext cx="0" cy="0"/>
+          <a:chOff x="0" y="0"/>
+          <a:chExt cx="0" cy="0"/>
+        </a:xfrm>
+      </p:grpSpPr>
+      <p:pic>
+        <p:nvPicPr>
+          <p:cNvPr id="245" name="Google Shape;245;p34"/>
+          <p:cNvPicPr preferRelativeResize="0"/>
+          <p:nvPr/>
+        </p:nvPicPr>
+        <p:blipFill>
+          <a:blip r:embed="rId3">
+            <a:alphaModFix/>
+          </a:blip>
+          <a:stretch>
+            <a:fillRect/>
+          </a:stretch>
+        </p:blipFill>
+        <p:spPr>
+          <a:xfrm>
+            <a:off x="152400" y="152400"/>
+            <a:ext cx="8337969" cy="4838701"/>
+          </a:xfrm>
+          <a:prstGeom prst="rect">
+            <a:avLst/>
+          </a:prstGeom>
+          <a:noFill/>
+          <a:ln>
+            <a:noFill/>
+          </a:ln>
+        </p:spPr>
+      </p:pic>
+    </p:spTree>
+  </p:cSld>
+  <p:clrMapOvr>
+    <a:masterClrMapping/>
+  </p:clrMapOvr>
+</p:sld>
+</file>
+
+<file path=ppt/slides/slide23.xml><?xml version="1.0" encoding="utf-8"?>
+<p:sld xmlns:a="http://schemas.openxmlformats.org/drawingml/2006/main" xmlns:r="http://schemas.openxmlformats.org/officeDocument/2006/relationships" xmlns:mc="http://schemas.openxmlformats.org/markup-compatibility/2006" xmlns:mv="urn:schemas-microsoft-com:mac:vml" xmlns:p="http://schemas.openxmlformats.org/presentationml/2006/main" xmlns:c="http://schemas.openxmlformats.org/drawingml/2006/chart" xmlns:dgm="http://schemas.openxmlformats.org/drawingml/2006/diagram" xmlns:o="urn:schemas-microsoft-com:office:office" xmlns:v="urn:schemas-microsoft-com:vml" xmlns:pvml="urn:schemas-microsoft-com:office:powerpoint" xmlns:com="http://schemas.openxmlformats.org/drawingml/2006/compatibility" xmlns:p14="http://schemas.microsoft.com/office/powerpoint/2010/main" xmlns:p15="http://schemas.microsoft.com/office/powerpoint/2012/main" xmlns:ahyp="http://schemas.microsoft.com/office/drawing/2018/hyperlinkcolor">
+  <p:cSld>
+    <p:spTree>
+      <p:nvGrpSpPr>
+        <p:cNvPr id="249" name="Shape 249"/>
+        <p:cNvGrpSpPr/>
+        <p:nvPr/>
+      </p:nvGrpSpPr>
+      <p:grpSpPr>
+        <a:xfrm>
+          <a:off x="0" y="0"/>
+          <a:ext cx="0" cy="0"/>
+          <a:chOff x="0" y="0"/>
+          <a:chExt cx="0" cy="0"/>
+        </a:xfrm>
+      </p:grpSpPr>
+      <p:sp>
+        <p:nvSpPr>
+          <p:cNvPr id="250" name="Google Shape;250;p35"/>
+          <p:cNvSpPr txBox="1"/>
+          <p:nvPr>
+            <p:ph type="title"/>
+          </p:nvPr>
+        </p:nvSpPr>
+        <p:spPr>
+          <a:xfrm>
+            <a:off x="819150" y="845600"/>
+            <a:ext cx="7505700" cy="954600"/>
+          </a:xfrm>
+          <a:prstGeom prst="rect">
+            <a:avLst/>
+          </a:prstGeom>
+        </p:spPr>
+        <p:txBody>
+          <a:bodyPr anchorCtr="0" anchor="t" bIns="91425" lIns="91425" spcFirstLastPara="1" rIns="91425" wrap="square" tIns="91425">
+            <a:normAutofit/>
+          </a:bodyPr>
+          <a:lstStyle/>
+          <a:p>
+            <a:pPr indent="0" lvl="0" marL="0" rtl="0" algn="l">
+              <a:spcBef>
+                <a:spcPts val="0"/>
+              </a:spcBef>
+              <a:spcAft>
+                <a:spcPts val="0"/>
+              </a:spcAft>
+              <a:buNone/>
+            </a:pPr>
+            <a:r>
+              <a:rPr lang="en"/>
+              <a:t>Resources</a:t>
+            </a:r>
+            <a:endParaRPr/>
+          </a:p>
+        </p:txBody>
+      </p:sp>
+      <p:sp>
+        <p:nvSpPr>
+          <p:cNvPr id="251" name="Google Shape;251;p35"/>
+          <p:cNvSpPr txBox="1"/>
+          <p:nvPr>
+            <p:ph idx="1" type="body"/>
+          </p:nvPr>
+        </p:nvSpPr>
+        <p:spPr>
+          <a:xfrm>
+            <a:off x="819150" y="1990725"/>
+            <a:ext cx="7505700" cy="2448000"/>
+          </a:xfrm>
+          <a:prstGeom prst="rect">
+            <a:avLst/>
+          </a:prstGeom>
+        </p:spPr>
+        <p:txBody>
+          <a:bodyPr anchorCtr="0" anchor="t" bIns="91425" lIns="91425" spcFirstLastPara="1" rIns="91425" wrap="square" tIns="91425">
+            <a:normAutofit fontScale="77500" lnSpcReduction="20000"/>
+          </a:bodyPr>
+          <a:lstStyle/>
+          <a:p>
+            <a:pPr indent="0" lvl="0" marL="0" rtl="0" algn="l">
+              <a:lnSpc>
+                <a:spcPct val="140000"/>
+              </a:lnSpc>
+              <a:spcBef>
+                <a:spcPts val="900"/>
+              </a:spcBef>
+              <a:spcAft>
+                <a:spcPts val="0"/>
+              </a:spcAft>
+              <a:buNone/>
+            </a:pPr>
+            <a:r>
+              <a:rPr b="1" lang="en" sz="1800" u="sng">
+                <a:solidFill>
+                  <a:schemeClr val="hlink"/>
+                </a:solidFill>
+                <a:latin typeface="Meiryo"/>
+                <a:ea typeface="Meiryo"/>
+                <a:cs typeface="Meiryo"/>
+                <a:sym typeface="Meiryo"/>
+                <a:hlinkClick r:id="rId3"/>
+              </a:rPr>
+              <a:t>https://learndjango.com/tutorials/django-signup-tutorial</a:t>
+            </a:r>
+            <a:endParaRPr b="1" sz="1800" u="sng">
+              <a:solidFill>
+                <a:schemeClr val="hlink"/>
+              </a:solidFill>
+              <a:latin typeface="Meiryo"/>
+              <a:ea typeface="Meiryo"/>
+              <a:cs typeface="Meiryo"/>
+              <a:sym typeface="Meiryo"/>
+            </a:endParaRPr>
+          </a:p>
+          <a:p>
+            <a:pPr indent="0" lvl="0" marL="0" rtl="0" algn="l">
+              <a:lnSpc>
+                <a:spcPct val="140000"/>
+              </a:lnSpc>
+              <a:spcBef>
+                <a:spcPts val="900"/>
+              </a:spcBef>
+              <a:spcAft>
+                <a:spcPts val="0"/>
+              </a:spcAft>
+              <a:buNone/>
+            </a:pPr>
+            <a:r>
+              <a:rPr b="1" lang="en" sz="1800" u="sng">
+                <a:solidFill>
+                  <a:schemeClr val="hlink"/>
+                </a:solidFill>
+                <a:latin typeface="Meiryo"/>
+                <a:ea typeface="Meiryo"/>
+                <a:cs typeface="Meiryo"/>
+                <a:sym typeface="Meiryo"/>
+                <a:hlinkClick r:id="rId4"/>
+              </a:rPr>
+              <a:t>https://learndjango.com/tutorials/django-login-and-logout-tutorial</a:t>
+            </a:r>
+            <a:endParaRPr b="1" sz="1800" u="sng">
+              <a:solidFill>
+                <a:schemeClr val="hlink"/>
+              </a:solidFill>
+              <a:latin typeface="Meiryo"/>
+              <a:ea typeface="Meiryo"/>
+              <a:cs typeface="Meiryo"/>
+              <a:sym typeface="Meiryo"/>
+            </a:endParaRPr>
+          </a:p>
+          <a:p>
+            <a:pPr indent="0" lvl="0" marL="0" rtl="0" algn="l">
+              <a:lnSpc>
+                <a:spcPct val="140000"/>
+              </a:lnSpc>
+              <a:spcBef>
+                <a:spcPts val="900"/>
+              </a:spcBef>
+              <a:spcAft>
+                <a:spcPts val="0"/>
+              </a:spcAft>
+              <a:buNone/>
+            </a:pPr>
+            <a:r>
+              <a:rPr b="1" lang="en" sz="1800" u="sng">
+                <a:solidFill>
+                  <a:schemeClr val="hlink"/>
+                </a:solidFill>
+                <a:latin typeface="Meiryo"/>
+                <a:ea typeface="Meiryo"/>
+                <a:cs typeface="Meiryo"/>
+                <a:sym typeface="Meiryo"/>
+                <a:hlinkClick r:id="rId5"/>
+              </a:rPr>
+              <a:t>https://getbootstrap.com/docs/5.3/getting-started/introduction/</a:t>
+            </a:r>
+            <a:endParaRPr b="1" sz="1800" u="sng">
+              <a:solidFill>
+                <a:schemeClr val="hlink"/>
+              </a:solidFill>
+              <a:latin typeface="Meiryo"/>
+              <a:ea typeface="Meiryo"/>
+              <a:cs typeface="Meiryo"/>
+              <a:sym typeface="Meiryo"/>
+            </a:endParaRPr>
+          </a:p>
+          <a:p>
+            <a:pPr indent="0" lvl="0" marL="0" rtl="0" algn="l">
+              <a:lnSpc>
+                <a:spcPct val="140000"/>
+              </a:lnSpc>
+              <a:spcBef>
+                <a:spcPts val="900"/>
+              </a:spcBef>
+              <a:spcAft>
+                <a:spcPts val="0"/>
+              </a:spcAft>
+              <a:buNone/>
+            </a:pPr>
+            <a:r>
+              <a:rPr b="1" lang="en" sz="1800" u="sng">
+                <a:solidFill>
+                  <a:schemeClr val="hlink"/>
+                </a:solidFill>
+                <a:latin typeface="Meiryo"/>
+                <a:ea typeface="Meiryo"/>
+                <a:cs typeface="Meiryo"/>
+                <a:sym typeface="Meiryo"/>
+                <a:hlinkClick r:id="rId6"/>
+              </a:rPr>
+              <a:t>https://docs.djangoproject.com/en/4.2/</a:t>
+            </a:r>
+            <a:endParaRPr b="1" sz="1800" u="sng">
+              <a:solidFill>
+                <a:schemeClr val="hlink"/>
+              </a:solidFill>
+              <a:latin typeface="Meiryo"/>
+              <a:ea typeface="Meiryo"/>
+              <a:cs typeface="Meiryo"/>
+              <a:sym typeface="Meiryo"/>
+            </a:endParaRPr>
+          </a:p>
+          <a:p>
+            <a:pPr indent="0" lvl="0" marL="0" rtl="0" algn="l">
+              <a:lnSpc>
+                <a:spcPct val="140000"/>
+              </a:lnSpc>
+              <a:spcBef>
+                <a:spcPts val="900"/>
+              </a:spcBef>
+              <a:spcAft>
+                <a:spcPts val="0"/>
+              </a:spcAft>
+              <a:buNone/>
+            </a:pPr>
+            <a:r>
+              <a:rPr b="1" lang="en" sz="1800" u="sng">
+                <a:solidFill>
+                  <a:schemeClr val="hlink"/>
+                </a:solidFill>
+                <a:latin typeface="Meiryo"/>
+                <a:ea typeface="Meiryo"/>
+                <a:cs typeface="Meiryo"/>
+                <a:sym typeface="Meiryo"/>
+                <a:hlinkClick r:id="rId7"/>
+              </a:rPr>
+              <a:t>https://mdbootstrap.com/docs/standard/navigation/navbar/</a:t>
+            </a:r>
+            <a:endParaRPr b="1" sz="1800" u="sng">
+              <a:solidFill>
+                <a:schemeClr val="hlink"/>
+              </a:solidFill>
+              <a:latin typeface="Meiryo"/>
+              <a:ea typeface="Meiryo"/>
+              <a:cs typeface="Meiryo"/>
+              <a:sym typeface="Meiryo"/>
+            </a:endParaRPr>
+          </a:p>
+          <a:p>
+            <a:pPr indent="0" lvl="0" marL="0" rtl="0" algn="l">
+              <a:lnSpc>
+                <a:spcPct val="140000"/>
+              </a:lnSpc>
+              <a:spcBef>
+                <a:spcPts val="900"/>
+              </a:spcBef>
+              <a:spcAft>
+                <a:spcPts val="0"/>
+              </a:spcAft>
+              <a:buNone/>
+            </a:pPr>
+            <a:r>
+              <a:rPr b="1" lang="en" sz="1800" u="sng">
+                <a:solidFill>
+                  <a:schemeClr val="hlink"/>
+                </a:solidFill>
+                <a:latin typeface="Meiryo"/>
+                <a:ea typeface="Meiryo"/>
+                <a:cs typeface="Meiryo"/>
+                <a:sym typeface="Meiryo"/>
+                <a:hlinkClick r:id="rId8"/>
+              </a:rPr>
+              <a:t>https://www.w3schools.com/django/</a:t>
+            </a:r>
+            <a:endParaRPr b="1" sz="1800" u="sng">
+              <a:solidFill>
+                <a:schemeClr val="hlink"/>
+              </a:solidFill>
+              <a:latin typeface="Meiryo"/>
+              <a:ea typeface="Meiryo"/>
+              <a:cs typeface="Meiryo"/>
+              <a:sym typeface="Meiryo"/>
+            </a:endParaRPr>
+          </a:p>
+          <a:p>
+            <a:pPr indent="0" lvl="0" marL="0" rtl="0" algn="l">
+              <a:spcBef>
+                <a:spcPts val="0"/>
+              </a:spcBef>
+              <a:spcAft>
+                <a:spcPts val="1200"/>
+              </a:spcAft>
+              <a:buNone/>
+            </a:pPr>
+            <a:r>
+              <a:t/>
+            </a:r>
+            <a:endParaRPr/>
+          </a:p>
+        </p:txBody>
+      </p:sp>
+    </p:spTree>
+  </p:cSld>
+  <p:clrMapOvr>
+    <a:masterClrMapping/>
+  </p:clrMapOvr>
+</p:sld>
+</file>
+
+<file path=ppt/slides/slide24.xml><?xml version="1.0" encoding="utf-8"?>
+<p:sld xmlns:a="http://schemas.openxmlformats.org/drawingml/2006/main" xmlns:r="http://schemas.openxmlformats.org/officeDocument/2006/relationships" xmlns:mc="http://schemas.openxmlformats.org/markup-compatibility/2006" xmlns:mv="urn:schemas-microsoft-com:mac:vml" xmlns:p="http://schemas.openxmlformats.org/presentationml/2006/main" xmlns:c="http://schemas.openxmlformats.org/drawingml/2006/chart" xmlns:dgm="http://schemas.openxmlformats.org/drawingml/2006/diagram" xmlns:o="urn:schemas-microsoft-com:office:office" xmlns:v="urn:schemas-microsoft-com:vml" xmlns:pvml="urn:schemas-microsoft-com:office:powerpoint" xmlns:com="http://schemas.openxmlformats.org/drawingml/2006/compatibility" xmlns:p14="http://schemas.microsoft.com/office/powerpoint/2010/main" xmlns:p15="http://schemas.microsoft.com/office/powerpoint/2012/main" xmlns:ahyp="http://schemas.microsoft.com/office/drawing/2018/hyperlinkcolor">
+  <p:cSld>
+    <p:spTree>
+      <p:nvGrpSpPr>
+        <p:cNvPr id="255" name="Shape 255"/>
+        <p:cNvGrpSpPr/>
+        <p:nvPr/>
+      </p:nvGrpSpPr>
+      <p:grpSpPr>
+        <a:xfrm>
+          <a:off x="0" y="0"/>
+          <a:ext cx="0" cy="0"/>
+          <a:chOff x="0" y="0"/>
+          <a:chExt cx="0" cy="0"/>
+        </a:xfrm>
+      </p:grpSpPr>
+      <p:sp>
+        <p:nvSpPr>
+          <p:cNvPr id="256" name="Google Shape;256;p36"/>
+          <p:cNvSpPr txBox="1"/>
+          <p:nvPr>
+            <p:ph type="title"/>
+          </p:nvPr>
+        </p:nvSpPr>
+        <p:spPr>
+          <a:xfrm>
+            <a:off x="1888684" y="1746100"/>
+            <a:ext cx="5377500" cy="1646100"/>
+          </a:xfrm>
+          <a:prstGeom prst="rect">
+            <a:avLst/>
+          </a:prstGeom>
+        </p:spPr>
+        <p:txBody>
+          <a:bodyPr anchorCtr="0" anchor="ctr" bIns="91425" lIns="91425" spcFirstLastPara="1" rIns="91425" wrap="square" tIns="91425">
+            <a:normAutofit/>
+          </a:bodyPr>
+          <a:lstStyle/>
+          <a:p>
+            <a:pPr indent="0" lvl="0" marL="0" rtl="0" algn="ctr">
+              <a:spcBef>
+                <a:spcPts val="0"/>
+              </a:spcBef>
+              <a:spcAft>
+                <a:spcPts val="0"/>
+              </a:spcAft>
+              <a:buNone/>
+            </a:pPr>
+            <a:r>
+              <a:rPr lang="en"/>
+              <a:t>Questions</a:t>
+            </a:r>
+            <a:r>
+              <a:rPr lang="en"/>
+              <a:t>?</a:t>
+            </a:r>
+            <a:endParaRPr/>
           </a:p>
         </p:txBody>
       </p:sp>
@@ -14113,6 +15031,285 @@
 </file>
 
 <file path=ppt/theme/theme1.xml><?xml version="1.0" encoding="utf-8"?>
+<a:theme xmlns:a="http://schemas.openxmlformats.org/drawingml/2006/main" xmlns:r="http://schemas.openxmlformats.org/officeDocument/2006/relationships">
+  <a:themeElements>
+    <a:clrScheme name="Default">
+      <a:dk1>
+        <a:srgbClr val="000000"/>
+      </a:dk1>
+      <a:lt1>
+        <a:srgbClr val="FFFFFF"/>
+      </a:lt1>
+      <a:dk2>
+        <a:srgbClr val="158158"/>
+      </a:dk2>
+      <a:lt2>
+        <a:srgbClr val="F3F3F3"/>
+      </a:lt2>
+      <a:accent1>
+        <a:srgbClr val="058DC7"/>
+      </a:accent1>
+      <a:accent2>
+        <a:srgbClr val="50B432"/>
+      </a:accent2>
+      <a:accent3>
+        <a:srgbClr val="ED561B"/>
+      </a:accent3>
+      <a:accent4>
+        <a:srgbClr val="EDEF00"/>
+      </a:accent4>
+      <a:accent5>
+        <a:srgbClr val="24CBE5"/>
+      </a:accent5>
+      <a:accent6>
+        <a:srgbClr val="64E572"/>
+      </a:accent6>
+      <a:hlink>
+        <a:srgbClr val="2200CC"/>
+      </a:hlink>
+      <a:folHlink>
+        <a:srgbClr val="551A8B"/>
+      </a:folHlink>
+    </a:clrScheme>
+    <a:fontScheme name="Office">
+      <a:majorFont>
+        <a:latin typeface="Arial"/>
+        <a:ea typeface=""/>
+        <a:cs typeface=""/>
+        <a:font script="Jpan" typeface="ＭＳ Ｐゴシック"/>
+        <a:font script="Hang" typeface="맑은 고딕"/>
+        <a:font script="Hans" typeface="宋体"/>
+        <a:font script="Hant" typeface="新細明體"/>
+        <a:font script="Arab" typeface="Times New Roman"/>
+        <a:font script="Hebr" typeface="Times New Roman"/>
+        <a:font script="Thai" typeface="Angsana New"/>
+        <a:font script="Ethi" typeface="Nyala"/>
+        <a:font script="Beng" typeface="Vrinda"/>
+        <a:font script="Gujr" typeface="Shruti"/>
+        <a:font script="Khmr" typeface="MoolBoran"/>
+        <a:font script="Knda" typeface="Tunga"/>
+        <a:font script="Guru" typeface="Raavi"/>
+        <a:font script="Cans" typeface="Euphemia"/>
+        <a:font script="Cher" typeface="Plantagenet Cherokee"/>
+        <a:font script="Yiii" typeface="Microsoft Yi Baiti"/>
+        <a:font script="Tibt" typeface="Microsoft Himalaya"/>
+        <a:font script="Thaa" typeface="MV Boli"/>
+        <a:font script="Deva" typeface="Mangal"/>
+        <a:font script="Telu" typeface="Gautami"/>
+        <a:font script="Taml" typeface="Latha"/>
+        <a:font script="Syrc" typeface="Estrangelo Edessa"/>
+        <a:font script="Orya" typeface="Kalinga"/>
+        <a:font script="Mlym" typeface="Kartika"/>
+        <a:font script="Laoo" typeface="DokChampa"/>
+        <a:font script="Sinh" typeface="Iskoola Pota"/>
+        <a:font script="Mong" typeface="Mongolian Baiti"/>
+        <a:font script="Viet" typeface="Times New Roman"/>
+        <a:font script="Uigh" typeface="Microsoft Uighur"/>
+        <a:font script="Geor" typeface="Sylfaen"/>
+      </a:majorFont>
+      <a:minorFont>
+        <a:latin typeface="Arial"/>
+        <a:ea typeface=""/>
+        <a:cs typeface=""/>
+        <a:font script="Jpan" typeface="ＭＳ Ｐゴシック"/>
+        <a:font script="Hang" typeface="맑은 고딕"/>
+        <a:font script="Hans" typeface="宋体"/>
+        <a:font script="Hant" typeface="新細明體"/>
+        <a:font script="Arab" typeface="Arial"/>
+        <a:font script="Hebr" typeface="Arial"/>
+        <a:font script="Thai" typeface="Cordia New"/>
+        <a:font script="Ethi" typeface="Nyala"/>
+        <a:font script="Beng" typeface="Vrinda"/>
+        <a:font script="Gujr" typeface="Shruti"/>
+        <a:font script="Khmr" typeface="DaunPenh"/>
+        <a:font script="Knda" typeface="Tunga"/>
+        <a:font script="Guru" typeface="Raavi"/>
+        <a:font script="Cans" typeface="Euphemia"/>
+        <a:font script="Cher" typeface="Plantagenet Cherokee"/>
+        <a:font script="Yiii" typeface="Microsoft Yi Baiti"/>
+        <a:font script="Tibt" typeface="Microsoft Himalaya"/>
+        <a:font script="Thaa" typeface="MV Boli"/>
+        <a:font script="Deva" typeface="Mangal"/>
+        <a:font script="Telu" typeface="Gautami"/>
+        <a:font script="Taml" typeface="Latha"/>
+        <a:font script="Syrc" typeface="Estrangelo Edessa"/>
+        <a:font script="Orya" typeface="Kalinga"/>
+        <a:font script="Mlym" typeface="Kartika"/>
+        <a:font script="Laoo" typeface="DokChampa"/>
+        <a:font script="Sinh" typeface="Iskoola Pota"/>
+        <a:font script="Mong" typeface="Mongolian Baiti"/>
+        <a:font script="Viet" typeface="Arial"/>
+        <a:font script="Uigh" typeface="Microsoft Uighur"/>
+        <a:font script="Geor" typeface="Sylfaen"/>
+      </a:minorFont>
+    </a:fontScheme>
+    <a:fmtScheme name="Office">
+      <a:fillStyleLst>
+        <a:solidFill>
+          <a:schemeClr val="phClr"/>
+        </a:solidFill>
+        <a:gradFill rotWithShape="1">
+          <a:gsLst>
+            <a:gs pos="0">
+              <a:schemeClr val="phClr">
+                <a:tint val="50000"/>
+                <a:satMod val="300000"/>
+              </a:schemeClr>
+            </a:gs>
+            <a:gs pos="35000">
+              <a:schemeClr val="phClr">
+                <a:tint val="37000"/>
+                <a:satMod val="300000"/>
+              </a:schemeClr>
+            </a:gs>
+            <a:gs pos="100000">
+              <a:schemeClr val="phClr">
+                <a:tint val="15000"/>
+                <a:satMod val="350000"/>
+              </a:schemeClr>
+            </a:gs>
+          </a:gsLst>
+          <a:lin ang="16200000" scaled="1"/>
+        </a:gradFill>
+        <a:gradFill rotWithShape="1">
+          <a:gsLst>
+            <a:gs pos="0">
+              <a:schemeClr val="phClr">
+                <a:tint val="100000"/>
+                <a:shade val="100000"/>
+                <a:satMod val="130000"/>
+              </a:schemeClr>
+            </a:gs>
+            <a:gs pos="100000">
+              <a:schemeClr val="phClr">
+                <a:tint val="50000"/>
+                <a:shade val="100000"/>
+                <a:satMod val="350000"/>
+              </a:schemeClr>
+            </a:gs>
+          </a:gsLst>
+          <a:lin ang="16200000" scaled="0"/>
+        </a:gradFill>
+      </a:fillStyleLst>
+      <a:lnStyleLst>
+        <a:ln w="9525" cap="flat" cmpd="sng" algn="ctr">
+          <a:solidFill>
+            <a:schemeClr val="phClr">
+              <a:shade val="95000"/>
+              <a:satMod val="105000"/>
+            </a:schemeClr>
+          </a:solidFill>
+          <a:prstDash val="solid"/>
+        </a:ln>
+        <a:ln w="25400" cap="flat" cmpd="sng" algn="ctr">
+          <a:solidFill>
+            <a:schemeClr val="phClr"/>
+          </a:solidFill>
+          <a:prstDash val="solid"/>
+        </a:ln>
+        <a:ln w="38100" cap="flat" cmpd="sng" algn="ctr">
+          <a:solidFill>
+            <a:schemeClr val="phClr"/>
+          </a:solidFill>
+          <a:prstDash val="solid"/>
+        </a:ln>
+      </a:lnStyleLst>
+      <a:effectStyleLst>
+        <a:effectStyle>
+          <a:effectLst>
+            <a:outerShdw blurRad="40000" dist="20000" dir="5400000" rotWithShape="0">
+              <a:srgbClr val="000000">
+                <a:alpha val="38000"/>
+              </a:srgbClr>
+            </a:outerShdw>
+          </a:effectLst>
+        </a:effectStyle>
+        <a:effectStyle>
+          <a:effectLst>
+            <a:outerShdw blurRad="40000" dist="23000" dir="5400000" rotWithShape="0">
+              <a:srgbClr val="000000">
+                <a:alpha val="35000"/>
+              </a:srgbClr>
+            </a:outerShdw>
+          </a:effectLst>
+        </a:effectStyle>
+        <a:effectStyle>
+          <a:effectLst>
+            <a:outerShdw blurRad="40000" dist="23000" dir="5400000" rotWithShape="0">
+              <a:srgbClr val="000000">
+                <a:alpha val="35000"/>
+              </a:srgbClr>
+            </a:outerShdw>
+          </a:effectLst>
+          <a:scene3d>
+            <a:camera prst="orthographicFront">
+              <a:rot lat="0" lon="0" rev="0"/>
+            </a:camera>
+            <a:lightRig rig="threePt" dir="t">
+              <a:rot lat="0" lon="0" rev="1200000"/>
+            </a:lightRig>
+          </a:scene3d>
+          <a:sp3d>
+            <a:bevelT w="63500" h="25400"/>
+          </a:sp3d>
+        </a:effectStyle>
+      </a:effectStyleLst>
+      <a:bgFillStyleLst>
+        <a:solidFill>
+          <a:schemeClr val="phClr"/>
+        </a:solidFill>
+        <a:gradFill rotWithShape="1">
+          <a:gsLst>
+            <a:gs pos="0">
+              <a:schemeClr val="phClr">
+                <a:tint val="40000"/>
+                <a:satMod val="350000"/>
+              </a:schemeClr>
+            </a:gs>
+            <a:gs pos="40000">
+              <a:schemeClr val="phClr">
+                <a:tint val="45000"/>
+                <a:shade val="99000"/>
+                <a:satMod val="350000"/>
+              </a:schemeClr>
+            </a:gs>
+            <a:gs pos="100000">
+              <a:schemeClr val="phClr">
+                <a:shade val="20000"/>
+                <a:satMod val="255000"/>
+              </a:schemeClr>
+            </a:gs>
+          </a:gsLst>
+          <a:path path="circle">
+            <a:fillToRect l="50000" t="-80000" r="50000" b="180000"/>
+          </a:path>
+        </a:gradFill>
+        <a:gradFill rotWithShape="1">
+          <a:gsLst>
+            <a:gs pos="0">
+              <a:schemeClr val="phClr">
+                <a:tint val="80000"/>
+                <a:satMod val="300000"/>
+              </a:schemeClr>
+            </a:gs>
+            <a:gs pos="100000">
+              <a:schemeClr val="phClr">
+                <a:shade val="30000"/>
+                <a:satMod val="200000"/>
+              </a:schemeClr>
+            </a:gs>
+          </a:gsLst>
+          <a:path path="circle">
+            <a:fillToRect l="50000" t="50000" r="50000" b="50000"/>
+          </a:path>
+        </a:gradFill>
+      </a:bgFillStyleLst>
+    </a:fmtScheme>
+  </a:themeElements>
+</a:theme>
+</file>
+
+<file path=ppt/theme/theme2.xml><?xml version="1.0" encoding="utf-8"?>
 <a:theme xmlns:a="http://schemas.openxmlformats.org/drawingml/2006/main" xmlns:r="http://schemas.openxmlformats.org/officeDocument/2006/relationships" name="Shift">
   <a:themeElements>
     <a:clrScheme name="Shift">
@@ -14389,283 +15586,4 @@
     </a:fmtScheme>
   </a:themeElements>
 </a:theme>
-</file>
-
-<file path=ppt/theme/theme2.xml><?xml version="1.0" encoding="utf-8"?>
-<a:theme xmlns:a="http://schemas.openxmlformats.org/drawingml/2006/main" xmlns:r="http://schemas.openxmlformats.org/officeDocument/2006/relationships">
-  <a:themeElements>
-    <a:clrScheme name="Default">
-      <a:dk1>
-        <a:srgbClr val="000000"/>
-      </a:dk1>
-      <a:lt1>
-        <a:srgbClr val="FFFFFF"/>
-      </a:lt1>
-      <a:dk2>
-        <a:srgbClr val="158158"/>
-      </a:dk2>
-      <a:lt2>
-        <a:srgbClr val="F3F3F3"/>
-      </a:lt2>
-      <a:accent1>
-        <a:srgbClr val="058DC7"/>
-      </a:accent1>
-      <a:accent2>
-        <a:srgbClr val="50B432"/>
-      </a:accent2>
-      <a:accent3>
-        <a:srgbClr val="ED561B"/>
-      </a:accent3>
-      <a:accent4>
-        <a:srgbClr val="EDEF00"/>
-      </a:accent4>
-      <a:accent5>
-        <a:srgbClr val="24CBE5"/>
-      </a:accent5>
-      <a:accent6>
-        <a:srgbClr val="64E572"/>
-      </a:accent6>
-      <a:hlink>
-        <a:srgbClr val="2200CC"/>
-      </a:hlink>
-      <a:folHlink>
-        <a:srgbClr val="551A8B"/>
-      </a:folHlink>
-    </a:clrScheme>
-    <a:fontScheme name="Office">
-      <a:majorFont>
-        <a:latin typeface="Arial"/>
-        <a:ea typeface=""/>
-        <a:cs typeface=""/>
-        <a:font script="Jpan" typeface="ＭＳ Ｐゴシック"/>
-        <a:font script="Hang" typeface="맑은 고딕"/>
-        <a:font script="Hans" typeface="宋体"/>
-        <a:font script="Hant" typeface="新細明體"/>
-        <a:font script="Arab" typeface="Times New Roman"/>
-        <a:font script="Hebr" typeface="Times New Roman"/>
-        <a:font script="Thai" typeface="Angsana New"/>
-        <a:font script="Ethi" typeface="Nyala"/>
-        <a:font script="Beng" typeface="Vrinda"/>
-        <a:font script="Gujr" typeface="Shruti"/>
-        <a:font script="Khmr" typeface="MoolBoran"/>
-        <a:font script="Knda" typeface="Tunga"/>
-        <a:font script="Guru" typeface="Raavi"/>
-        <a:font script="Cans" typeface="Euphemia"/>
-        <a:font script="Cher" typeface="Plantagenet Cherokee"/>
-        <a:font script="Yiii" typeface="Microsoft Yi Baiti"/>
-        <a:font script="Tibt" typeface="Microsoft Himalaya"/>
-        <a:font script="Thaa" typeface="MV Boli"/>
-        <a:font script="Deva" typeface="Mangal"/>
-        <a:font script="Telu" typeface="Gautami"/>
-        <a:font script="Taml" typeface="Latha"/>
-        <a:font script="Syrc" typeface="Estrangelo Edessa"/>
-        <a:font script="Orya" typeface="Kalinga"/>
-        <a:font script="Mlym" typeface="Kartika"/>
-        <a:font script="Laoo" typeface="DokChampa"/>
-        <a:font script="Sinh" typeface="Iskoola Pota"/>
-        <a:font script="Mong" typeface="Mongolian Baiti"/>
-        <a:font script="Viet" typeface="Times New Roman"/>
-        <a:font script="Uigh" typeface="Microsoft Uighur"/>
-        <a:font script="Geor" typeface="Sylfaen"/>
-      </a:majorFont>
-      <a:minorFont>
-        <a:latin typeface="Arial"/>
-        <a:ea typeface=""/>
-        <a:cs typeface=""/>
-        <a:font script="Jpan" typeface="ＭＳ Ｐゴシック"/>
-        <a:font script="Hang" typeface="맑은 고딕"/>
-        <a:font script="Hans" typeface="宋体"/>
-        <a:font script="Hant" typeface="新細明體"/>
-        <a:font script="Arab" typeface="Arial"/>
-        <a:font script="Hebr" typeface="Arial"/>
-        <a:font script="Thai" typeface="Cordia New"/>
-        <a:font script="Ethi" typeface="Nyala"/>
-        <a:font script="Beng" typeface="Vrinda"/>
-        <a:font script="Gujr" typeface="Shruti"/>
-        <a:font script="Khmr" typeface="DaunPenh"/>
-        <a:font script="Knda" typeface="Tunga"/>
-        <a:font script="Guru" typeface="Raavi"/>
-        <a:font script="Cans" typeface="Euphemia"/>
-        <a:font script="Cher" typeface="Plantagenet Cherokee"/>
-        <a:font script="Yiii" typeface="Microsoft Yi Baiti"/>
-        <a:font script="Tibt" typeface="Microsoft Himalaya"/>
-        <a:font script="Thaa" typeface="MV Boli"/>
-        <a:font script="Deva" typeface="Mangal"/>
-        <a:font script="Telu" typeface="Gautami"/>
-        <a:font script="Taml" typeface="Latha"/>
-        <a:font script="Syrc" typeface="Estrangelo Edessa"/>
-        <a:font script="Orya" typeface="Kalinga"/>
-        <a:font script="Mlym" typeface="Kartika"/>
-        <a:font script="Laoo" typeface="DokChampa"/>
-        <a:font script="Sinh" typeface="Iskoola Pota"/>
-        <a:font script="Mong" typeface="Mongolian Baiti"/>
-        <a:font script="Viet" typeface="Arial"/>
-        <a:font script="Uigh" typeface="Microsoft Uighur"/>
-        <a:font script="Geor" typeface="Sylfaen"/>
-      </a:minorFont>
-    </a:fontScheme>
-    <a:fmtScheme name="Office">
-      <a:fillStyleLst>
-        <a:solidFill>
-          <a:schemeClr val="phClr"/>
-        </a:solidFill>
-        <a:gradFill rotWithShape="1">
-          <a:gsLst>
-            <a:gs pos="0">
-              <a:schemeClr val="phClr">
-                <a:tint val="50000"/>
-                <a:satMod val="300000"/>
-              </a:schemeClr>
-            </a:gs>
-            <a:gs pos="35000">
-              <a:schemeClr val="phClr">
-                <a:tint val="37000"/>
-                <a:satMod val="300000"/>
-              </a:schemeClr>
-            </a:gs>
-            <a:gs pos="100000">
-              <a:schemeClr val="phClr">
-                <a:tint val="15000"/>
-                <a:satMod val="350000"/>
-              </a:schemeClr>
-            </a:gs>
-          </a:gsLst>
-          <a:lin ang="16200000" scaled="1"/>
-        </a:gradFill>
-        <a:gradFill rotWithShape="1">
-          <a:gsLst>
-            <a:gs pos="0">
-              <a:schemeClr val="phClr">
-                <a:tint val="100000"/>
-                <a:shade val="100000"/>
-                <a:satMod val="130000"/>
-              </a:schemeClr>
-            </a:gs>
-            <a:gs pos="100000">
-              <a:schemeClr val="phClr">
-                <a:tint val="50000"/>
-                <a:shade val="100000"/>
-                <a:satMod val="350000"/>
-              </a:schemeClr>
-            </a:gs>
-          </a:gsLst>
-          <a:lin ang="16200000" scaled="0"/>
-        </a:gradFill>
-      </a:fillStyleLst>
-      <a:lnStyleLst>
-        <a:ln w="9525" cap="flat" cmpd="sng" algn="ctr">
-          <a:solidFill>
-            <a:schemeClr val="phClr">
-              <a:shade val="95000"/>
-              <a:satMod val="105000"/>
-            </a:schemeClr>
-          </a:solidFill>
-          <a:prstDash val="solid"/>
-        </a:ln>
-        <a:ln w="25400" cap="flat" cmpd="sng" algn="ctr">
-          <a:solidFill>
-            <a:schemeClr val="phClr"/>
-          </a:solidFill>
-          <a:prstDash val="solid"/>
-        </a:ln>
-        <a:ln w="38100" cap="flat" cmpd="sng" algn="ctr">
-          <a:solidFill>
-            <a:schemeClr val="phClr"/>
-          </a:solidFill>
-          <a:prstDash val="solid"/>
-        </a:ln>
-      </a:lnStyleLst>
-      <a:effectStyleLst>
-        <a:effectStyle>
-          <a:effectLst>
-            <a:outerShdw blurRad="40000" dist="20000" dir="5400000" rotWithShape="0">
-              <a:srgbClr val="000000">
-                <a:alpha val="38000"/>
-              </a:srgbClr>
-            </a:outerShdw>
-          </a:effectLst>
-        </a:effectStyle>
-        <a:effectStyle>
-          <a:effectLst>
-            <a:outerShdw blurRad="40000" dist="23000" dir="5400000" rotWithShape="0">
-              <a:srgbClr val="000000">
-                <a:alpha val="35000"/>
-              </a:srgbClr>
-            </a:outerShdw>
-          </a:effectLst>
-        </a:effectStyle>
-        <a:effectStyle>
-          <a:effectLst>
-            <a:outerShdw blurRad="40000" dist="23000" dir="5400000" rotWithShape="0">
-              <a:srgbClr val="000000">
-                <a:alpha val="35000"/>
-              </a:srgbClr>
-            </a:outerShdw>
-          </a:effectLst>
-          <a:scene3d>
-            <a:camera prst="orthographicFront">
-              <a:rot lat="0" lon="0" rev="0"/>
-            </a:camera>
-            <a:lightRig rig="threePt" dir="t">
-              <a:rot lat="0" lon="0" rev="1200000"/>
-            </a:lightRig>
-          </a:scene3d>
-          <a:sp3d>
-            <a:bevelT w="63500" h="25400"/>
-          </a:sp3d>
-        </a:effectStyle>
-      </a:effectStyleLst>
-      <a:bgFillStyleLst>
-        <a:solidFill>
-          <a:schemeClr val="phClr"/>
-        </a:solidFill>
-        <a:gradFill rotWithShape="1">
-          <a:gsLst>
-            <a:gs pos="0">
-              <a:schemeClr val="phClr">
-                <a:tint val="40000"/>
-                <a:satMod val="350000"/>
-              </a:schemeClr>
-            </a:gs>
-            <a:gs pos="40000">
-              <a:schemeClr val="phClr">
-                <a:tint val="45000"/>
-                <a:shade val="99000"/>
-                <a:satMod val="350000"/>
-              </a:schemeClr>
-            </a:gs>
-            <a:gs pos="100000">
-              <a:schemeClr val="phClr">
-                <a:shade val="20000"/>
-                <a:satMod val="255000"/>
-              </a:schemeClr>
-            </a:gs>
-          </a:gsLst>
-          <a:path path="circle">
-            <a:fillToRect l="50000" t="-80000" r="50000" b="180000"/>
-          </a:path>
-        </a:gradFill>
-        <a:gradFill rotWithShape="1">
-          <a:gsLst>
-            <a:gs pos="0">
-              <a:schemeClr val="phClr">
-                <a:tint val="80000"/>
-                <a:satMod val="300000"/>
-              </a:schemeClr>
-            </a:gs>
-            <a:gs pos="100000">
-              <a:schemeClr val="phClr">
-                <a:shade val="30000"/>
-                <a:satMod val="200000"/>
-              </a:schemeClr>
-            </a:gs>
-          </a:gsLst>
-          <a:path path="circle">
-            <a:fillToRect l="50000" t="50000" r="50000" b="50000"/>
-          </a:path>
-        </a:gradFill>
-      </a:bgFillStyleLst>
-    </a:fmtScheme>
-  </a:themeElements>
-</a:theme>
 </file>
</xml_diff>